<commit_message>
Add previously removed file
</commit_message>
<xml_diff>
--- a/Project3-WebScraping/NandaRajarathinam/Business School Tier Prediction - Logistic Regression.pptx
+++ b/Project3-WebScraping/NandaRajarathinam/Business School Tier Prediction - Logistic Regression.pptx
@@ -12,13 +12,14 @@
     <p:sldId id="259" r:id="rId6"/>
     <p:sldId id="261" r:id="rId7"/>
     <p:sldId id="263" r:id="rId8"/>
-    <p:sldId id="262" r:id="rId9"/>
-    <p:sldId id="264" r:id="rId10"/>
+    <p:sldId id="264" r:id="rId9"/>
+    <p:sldId id="262" r:id="rId10"/>
     <p:sldId id="260" r:id="rId11"/>
     <p:sldId id="265" r:id="rId12"/>
     <p:sldId id="269" r:id="rId13"/>
     <p:sldId id="266" r:id="rId14"/>
-    <p:sldId id="268" r:id="rId15"/>
+    <p:sldId id="270" r:id="rId15"/>
+    <p:sldId id="268" r:id="rId16"/>
   </p:sldIdLst>
   <p:sldSz cx="12192000" cy="6858000"/>
   <p:notesSz cx="6858000" cy="9144000"/>
@@ -5116,7 +5117,7 @@
                 <a:latin typeface="Arial" panose="020B0604020202020204" pitchFamily="34" charset="0"/>
                 <a:cs typeface="Arial" panose="020B0604020202020204" pitchFamily="34" charset="0"/>
               </a:rPr>
-              <a:t>True Vs Predicted Value</a:t>
+              <a:t>Test Accuracy</a:t>
             </a:r>
             <a:endParaRPr lang="en-US" sz="4000" dirty="0">
               <a:latin typeface="Arial" panose="020B0604020202020204" pitchFamily="34" charset="0"/>
@@ -5472,6 +5473,36 @@
           </a:graphicData>
         </a:graphic>
       </p:graphicFrame>
+      <p:sp>
+        <p:nvSpPr>
+          <p:cNvPr id="3" name="TextBox 2"/>
+          <p:cNvSpPr txBox="1"/>
+          <p:nvPr/>
+        </p:nvSpPr>
+        <p:spPr>
+          <a:xfrm>
+            <a:off x="1196789" y="4625788"/>
+            <a:ext cx="6266329" cy="369332"/>
+          </a:xfrm>
+          <a:prstGeom prst="rect">
+            <a:avLst/>
+          </a:prstGeom>
+          <a:noFill/>
+        </p:spPr>
+        <p:txBody>
+          <a:bodyPr wrap="square" rtlCol="0">
+            <a:spAutoFit/>
+          </a:bodyPr>
+          <a:lstStyle/>
+          <a:p>
+            <a:r>
+              <a:rPr lang="en-US" dirty="0" smtClean="0"/>
+              <a:t>McFadden’s R squared = 66.2%</a:t>
+            </a:r>
+            <a:endParaRPr lang="en-US" dirty="0"/>
+          </a:p>
+        </p:txBody>
+      </p:sp>
     </p:spTree>
     <p:extLst>
       <p:ext uri="{BB962C8B-B14F-4D97-AF65-F5344CB8AC3E}">
@@ -5531,7 +5562,7 @@
                 <a:latin typeface="Arial" panose="020B0604020202020204" pitchFamily="34" charset="0"/>
                 <a:cs typeface="Arial" panose="020B0604020202020204" pitchFamily="34" charset="0"/>
               </a:rPr>
-              <a:t>Insights</a:t>
+              <a:t>Next Steps</a:t>
             </a:r>
             <a:endParaRPr lang="en-US" sz="4000" dirty="0">
               <a:latin typeface="Arial" panose="020B0604020202020204" pitchFamily="34" charset="0"/>
@@ -5566,20 +5597,10 @@
               <a:buFont typeface="Wingdings" panose="05000000000000000000" pitchFamily="2" charset="2"/>
               <a:buChar char="v"/>
             </a:pPr>
-            <a:r>
-              <a:rPr lang="en-US" sz="1600" dirty="0" smtClean="0">
-                <a:latin typeface="Arial" panose="020B0604020202020204" pitchFamily="34" charset="0"/>
-                <a:cs typeface="Arial" panose="020B0604020202020204" pitchFamily="34" charset="0"/>
-              </a:rPr>
-              <a:t> </a:t>
-            </a:r>
-            <a:r>
-              <a:rPr lang="en-US" sz="1600" dirty="0" smtClean="0">
-                <a:latin typeface="Arial" panose="020B0604020202020204" pitchFamily="34" charset="0"/>
-                <a:cs typeface="Arial" panose="020B0604020202020204" pitchFamily="34" charset="0"/>
-              </a:rPr>
-              <a:t>GMAT Score, Annual Compensation(upon graduation), percentage of students who received a job offer and effectiveness of the school’s Career Services group are the four predictors that are statistically significant (at 5 % significance level) in determining whether a school is a Top tier Business school</a:t>
-            </a:r>
+            <a:endParaRPr lang="en-US" sz="1600" dirty="0" smtClean="0">
+              <a:latin typeface="Arial" panose="020B0604020202020204" pitchFamily="34" charset="0"/>
+              <a:cs typeface="Arial" panose="020B0604020202020204" pitchFamily="34" charset="0"/>
+            </a:endParaRPr>
           </a:p>
           <a:p>
             <a:pPr>
@@ -5587,6 +5608,19 @@
               <a:buChar char="v"/>
             </a:pPr>
             <a:r>
+              <a:rPr lang="en-US" sz="1600" dirty="0" smtClean="0">
+                <a:latin typeface="Arial" panose="020B0604020202020204" pitchFamily="34" charset="0"/>
+                <a:cs typeface="Arial" panose="020B0604020202020204" pitchFamily="34" charset="0"/>
+              </a:rPr>
+              <a:t> Use step wise selection to add / remove predictors and see if that improve model’s R squared</a:t>
+            </a:r>
+          </a:p>
+          <a:p>
+            <a:pPr>
+              <a:buFont typeface="Wingdings" panose="05000000000000000000" pitchFamily="2" charset="2"/>
+              <a:buChar char="v"/>
+            </a:pPr>
+            <a:r>
               <a:rPr lang="en-US" sz="1600" dirty="0">
                 <a:latin typeface="Arial" panose="020B0604020202020204" pitchFamily="34" charset="0"/>
                 <a:cs typeface="Arial" panose="020B0604020202020204" pitchFamily="34" charset="0"/>
@@ -5598,50 +5632,143 @@
                 <a:latin typeface="Arial" panose="020B0604020202020204" pitchFamily="34" charset="0"/>
                 <a:cs typeface="Arial" panose="020B0604020202020204" pitchFamily="34" charset="0"/>
               </a:rPr>
-              <a:t>There is no statistical significance regarding the Students rating (perception) of </a:t>
-            </a:r>
+              <a:t>Expand the test dataset and rerun the model for other years (2012 through 2014) and verify prediction accuracy</a:t>
+            </a:r>
+          </a:p>
+          <a:p>
+            <a:pPr>
+              <a:buFont typeface="Wingdings" panose="05000000000000000000" pitchFamily="2" charset="2"/>
+              <a:buChar char="v"/>
+            </a:pPr>
             <a:r>
               <a:rPr lang="en-US" sz="1600" dirty="0">
                 <a:latin typeface="Arial" panose="020B0604020202020204" pitchFamily="34" charset="0"/>
                 <a:cs typeface="Arial" panose="020B0604020202020204" pitchFamily="34" charset="0"/>
               </a:rPr>
-              <a:t>the full time MBA program </a:t>
+              <a:t> </a:t>
             </a:r>
             <a:r>
               <a:rPr lang="en-US" sz="1600" dirty="0" smtClean="0">
                 <a:latin typeface="Arial" panose="020B0604020202020204" pitchFamily="34" charset="0"/>
                 <a:cs typeface="Arial" panose="020B0604020202020204" pitchFamily="34" charset="0"/>
               </a:rPr>
-              <a:t>across the various regions of the world. But there is a statistical significance regarding students rating of the Faculty across the Business schools. </a:t>
+              <a:t>Try comparing this Economist ranking / tiering against Forbes Business school ranking </a:t>
             </a:r>
             <a:endParaRPr lang="en-US" sz="1600" dirty="0" smtClean="0">
               <a:latin typeface="Arial" panose="020B0604020202020204" pitchFamily="34" charset="0"/>
               <a:cs typeface="Arial" panose="020B0604020202020204" pitchFamily="34" charset="0"/>
             </a:endParaRPr>
           </a:p>
+        </p:txBody>
+      </p:sp>
+    </p:spTree>
+    <p:extLst>
+      <p:ext uri="{BB962C8B-B14F-4D97-AF65-F5344CB8AC3E}">
+        <p14:creationId xmlns:p14="http://schemas.microsoft.com/office/powerpoint/2010/main" val="1867124476"/>
+      </p:ext>
+    </p:extLst>
+  </p:cSld>
+  <p:clrMapOvr>
+    <a:masterClrMapping/>
+  </p:clrMapOvr>
+  <p:timing>
+    <p:tnLst>
+      <p:par>
+        <p:cTn id="1" dur="indefinite" restart="never" nodeType="tmRoot"/>
+      </p:par>
+    </p:tnLst>
+  </p:timing>
+</p:sld>
+</file>
+
+<file path=ppt/slides/slide15.xml><?xml version="1.0" encoding="utf-8"?>
+<p:sld xmlns:a="http://schemas.openxmlformats.org/drawingml/2006/main" xmlns:r="http://schemas.openxmlformats.org/officeDocument/2006/relationships" xmlns:p="http://schemas.openxmlformats.org/presentationml/2006/main">
+  <p:cSld>
+    <p:spTree>
+      <p:nvGrpSpPr>
+        <p:cNvPr id="1" name=""/>
+        <p:cNvGrpSpPr/>
+        <p:nvPr/>
+      </p:nvGrpSpPr>
+      <p:grpSpPr>
+        <a:xfrm>
+          <a:off x="0" y="0"/>
+          <a:ext cx="0" cy="0"/>
+          <a:chOff x="0" y="0"/>
+          <a:chExt cx="0" cy="0"/>
+        </a:xfrm>
+      </p:grpSpPr>
+      <p:sp>
+        <p:nvSpPr>
+          <p:cNvPr id="2" name="Title 1"/>
+          <p:cNvSpPr>
+            <a:spLocks noGrp="1"/>
+          </p:cNvSpPr>
+          <p:nvPr>
+            <p:ph type="title"/>
+          </p:nvPr>
+        </p:nvSpPr>
+        <p:spPr/>
+        <p:txBody>
+          <a:bodyPr>
+            <a:normAutofit/>
+          </a:bodyPr>
+          <a:lstStyle/>
+          <a:p>
+            <a:r>
+              <a:rPr lang="en-US" sz="4000" dirty="0" smtClean="0">
+                <a:latin typeface="Arial" panose="020B0604020202020204" pitchFamily="34" charset="0"/>
+                <a:cs typeface="Arial" panose="020B0604020202020204" pitchFamily="34" charset="0"/>
+              </a:rPr>
+              <a:t>Insights</a:t>
+            </a:r>
+            <a:endParaRPr lang="en-US" sz="4000" dirty="0">
+              <a:latin typeface="Arial" panose="020B0604020202020204" pitchFamily="34" charset="0"/>
+              <a:cs typeface="Arial" panose="020B0604020202020204" pitchFamily="34" charset="0"/>
+            </a:endParaRPr>
+          </a:p>
+        </p:txBody>
+      </p:sp>
+      <p:sp>
+        <p:nvSpPr>
+          <p:cNvPr id="3" name="Content Placeholder 2"/>
+          <p:cNvSpPr>
+            <a:spLocks noGrp="1"/>
+          </p:cNvSpPr>
+          <p:nvPr>
+            <p:ph idx="1"/>
+          </p:nvPr>
+        </p:nvSpPr>
+        <p:spPr>
+          <a:xfrm>
+            <a:off x="1097280" y="1845733"/>
+            <a:ext cx="10058400" cy="4339913"/>
+          </a:xfrm>
+        </p:spPr>
+        <p:txBody>
+          <a:bodyPr>
+            <a:normAutofit/>
+          </a:bodyPr>
+          <a:lstStyle/>
           <a:p>
             <a:pPr>
               <a:buFont typeface="Wingdings" panose="05000000000000000000" pitchFamily="2" charset="2"/>
               <a:buChar char="v"/>
             </a:pPr>
             <a:r>
-              <a:rPr lang="en-US" sz="1600" dirty="0">
-                <a:latin typeface="Arial" panose="020B0604020202020204" pitchFamily="34" charset="0"/>
-                <a:cs typeface="Arial" panose="020B0604020202020204" pitchFamily="34" charset="0"/>
-              </a:rPr>
-              <a:t> </a:t>
-            </a:r>
-            <a:r>
               <a:rPr lang="en-US" sz="1600" dirty="0" smtClean="0">
                 <a:latin typeface="Arial" panose="020B0604020202020204" pitchFamily="34" charset="0"/>
                 <a:cs typeface="Arial" panose="020B0604020202020204" pitchFamily="34" charset="0"/>
               </a:rPr>
-              <a:t>Outside of the U.S., Students tend to have a higher work experience before pursuing a full time MBA compared to U.S based Business schools</a:t>
-            </a:r>
-            <a:endParaRPr lang="en-US" sz="1600" dirty="0" smtClean="0">
-              <a:latin typeface="Arial" panose="020B0604020202020204" pitchFamily="34" charset="0"/>
-              <a:cs typeface="Arial" panose="020B0604020202020204" pitchFamily="34" charset="0"/>
-            </a:endParaRPr>
+              <a:t> GMAT Score, Annual Compensation(upon graduation), percentage of students who received a job offer and effectiveness of the school’s Career Services group are the four predictors that are statistically significant (at 5 % significance level) in determining whether a school is a Top tier Business </a:t>
+            </a:r>
+            <a:r>
+              <a:rPr lang="en-US" sz="1600" dirty="0" smtClean="0">
+                <a:latin typeface="Arial" panose="020B0604020202020204" pitchFamily="34" charset="0"/>
+                <a:cs typeface="Arial" panose="020B0604020202020204" pitchFamily="34" charset="0"/>
+              </a:rPr>
+              <a:t>school</a:t>
+            </a:r>
           </a:p>
           <a:p>
             <a:pPr>
@@ -5653,6 +5780,32 @@
                 <a:latin typeface="Arial" panose="020B0604020202020204" pitchFamily="34" charset="0"/>
                 <a:cs typeface="Arial" panose="020B0604020202020204" pitchFamily="34" charset="0"/>
               </a:rPr>
+              <a:t> Average GMAT score of the cohort is lower in Europe compared to the U.S</a:t>
+            </a:r>
+          </a:p>
+          <a:p>
+            <a:pPr>
+              <a:buFont typeface="Wingdings" panose="05000000000000000000" pitchFamily="2" charset="2"/>
+              <a:buChar char="v"/>
+            </a:pPr>
+            <a:r>
+              <a:rPr lang="en-US" sz="1600" dirty="0">
+                <a:latin typeface="Arial" panose="020B0604020202020204" pitchFamily="34" charset="0"/>
+                <a:cs typeface="Arial" panose="020B0604020202020204" pitchFamily="34" charset="0"/>
+              </a:rPr>
+              <a:t> Asia Pacific and Australian Business schools tend to have lower geographical diversity compared to their counterparts in Europe and U.S.</a:t>
+            </a:r>
+          </a:p>
+          <a:p>
+            <a:pPr>
+              <a:buFont typeface="Wingdings" panose="05000000000000000000" pitchFamily="2" charset="2"/>
+              <a:buChar char="v"/>
+            </a:pPr>
+            <a:r>
+              <a:rPr lang="en-US" sz="1600" dirty="0" smtClean="0">
+                <a:latin typeface="Arial" panose="020B0604020202020204" pitchFamily="34" charset="0"/>
+                <a:cs typeface="Arial" panose="020B0604020202020204" pitchFamily="34" charset="0"/>
+              </a:rPr>
               <a:t> </a:t>
             </a:r>
             <a:r>
@@ -5660,12 +5813,69 @@
                 <a:latin typeface="Arial" panose="020B0604020202020204" pitchFamily="34" charset="0"/>
                 <a:cs typeface="Arial" panose="020B0604020202020204" pitchFamily="34" charset="0"/>
               </a:rPr>
-              <a:t>Based on the Principal recruiters information, Consulting seems to be the industry of choice for the Full time MBA graduates followed by Technology and Financial Services.</a:t>
-            </a:r>
-            <a:endParaRPr lang="en-US" sz="1600" dirty="0">
-              <a:latin typeface="Arial" panose="020B0604020202020204" pitchFamily="34" charset="0"/>
-              <a:cs typeface="Arial" panose="020B0604020202020204" pitchFamily="34" charset="0"/>
-            </a:endParaRPr>
+              <a:t>There is no statistical significance regarding the Students rating (perception) of </a:t>
+            </a:r>
+            <a:r>
+              <a:rPr lang="en-US" sz="1600" dirty="0">
+                <a:latin typeface="Arial" panose="020B0604020202020204" pitchFamily="34" charset="0"/>
+                <a:cs typeface="Arial" panose="020B0604020202020204" pitchFamily="34" charset="0"/>
+              </a:rPr>
+              <a:t>the full time MBA program </a:t>
+            </a:r>
+            <a:r>
+              <a:rPr lang="en-US" sz="1600" dirty="0" smtClean="0">
+                <a:latin typeface="Arial" panose="020B0604020202020204" pitchFamily="34" charset="0"/>
+                <a:cs typeface="Arial" panose="020B0604020202020204" pitchFamily="34" charset="0"/>
+              </a:rPr>
+              <a:t>across the various regions of the world. But there is a statistical significance regarding students rating of the Faculty across the Business schools. </a:t>
+            </a:r>
+          </a:p>
+          <a:p>
+            <a:pPr>
+              <a:buFont typeface="Wingdings" panose="05000000000000000000" pitchFamily="2" charset="2"/>
+              <a:buChar char="v"/>
+            </a:pPr>
+            <a:r>
+              <a:rPr lang="en-US" sz="1600" dirty="0">
+                <a:latin typeface="Arial" panose="020B0604020202020204" pitchFamily="34" charset="0"/>
+                <a:cs typeface="Arial" panose="020B0604020202020204" pitchFamily="34" charset="0"/>
+              </a:rPr>
+              <a:t> </a:t>
+            </a:r>
+            <a:r>
+              <a:rPr lang="en-US" sz="1600" dirty="0" smtClean="0">
+                <a:latin typeface="Arial" panose="020B0604020202020204" pitchFamily="34" charset="0"/>
+                <a:cs typeface="Arial" panose="020B0604020202020204" pitchFamily="34" charset="0"/>
+              </a:rPr>
+              <a:t>Outside of the U.S., Students tend to have a higher work experience before pursuing a full time MBA compared to U.S based Business schools</a:t>
+            </a:r>
+          </a:p>
+          <a:p>
+            <a:pPr>
+              <a:buFont typeface="Wingdings" panose="05000000000000000000" pitchFamily="2" charset="2"/>
+              <a:buChar char="v"/>
+            </a:pPr>
+            <a:r>
+              <a:rPr lang="en-US" sz="1600" dirty="0">
+                <a:latin typeface="Arial" panose="020B0604020202020204" pitchFamily="34" charset="0"/>
+                <a:cs typeface="Arial" panose="020B0604020202020204" pitchFamily="34" charset="0"/>
+              </a:rPr>
+              <a:t> </a:t>
+            </a:r>
+            <a:r>
+              <a:rPr lang="en-US" sz="1600" dirty="0" smtClean="0">
+                <a:latin typeface="Arial" panose="020B0604020202020204" pitchFamily="34" charset="0"/>
+                <a:cs typeface="Arial" panose="020B0604020202020204" pitchFamily="34" charset="0"/>
+              </a:rPr>
+              <a:t>Based on the Principal recruiters information, Consulting seems to be the industry of choice for the Full time MBA graduates followed by Technology and Financial Services</a:t>
+            </a:r>
+            <a:r>
+              <a:rPr lang="en-US" sz="1600" dirty="0" smtClean="0">
+                <a:latin typeface="Arial" panose="020B0604020202020204" pitchFamily="34" charset="0"/>
+                <a:cs typeface="Arial" panose="020B0604020202020204" pitchFamily="34" charset="0"/>
+              </a:rPr>
+              <a:t>.</a:t>
+            </a:r>
           </a:p>
         </p:txBody>
       </p:sp>
@@ -6781,7 +6991,12 @@
             <p:ph type="title"/>
           </p:nvPr>
         </p:nvSpPr>
-        <p:spPr/>
+        <p:spPr>
+          <a:xfrm>
+            <a:off x="739588" y="286603"/>
+            <a:ext cx="10416092" cy="1450757"/>
+          </a:xfrm>
+        </p:spPr>
         <p:txBody>
           <a:bodyPr>
             <a:normAutofit/>
@@ -6789,11 +7004,18 @@
           <a:lstStyle/>
           <a:p>
             <a:r>
+              <a:rPr lang="en-US" sz="4000" dirty="0">
+                <a:latin typeface="Arial" panose="020B0604020202020204" pitchFamily="34" charset="0"/>
+                <a:cs typeface="Arial" panose="020B0604020202020204" pitchFamily="34" charset="0"/>
+              </a:rPr>
+              <a:t>Distribution of Average </a:t>
+            </a:r>
+            <a:r>
               <a:rPr lang="en-US" sz="4000" dirty="0" smtClean="0">
                 <a:latin typeface="Arial" panose="020B0604020202020204" pitchFamily="34" charset="0"/>
                 <a:cs typeface="Arial" panose="020B0604020202020204" pitchFamily="34" charset="0"/>
               </a:rPr>
-              <a:t>Distribution of Average Work Experience prior to MBA</a:t>
+              <a:t>Annual Compensation</a:t>
             </a:r>
             <a:endParaRPr lang="en-US" sz="4000" dirty="0">
               <a:latin typeface="Arial" panose="020B0604020202020204" pitchFamily="34" charset="0"/>
@@ -6826,15 +7048,15 @@
         </p:blipFill>
         <p:spPr>
           <a:xfrm>
-            <a:off x="2339788" y="1846263"/>
-            <a:ext cx="7234517" cy="4022725"/>
+            <a:off x="2447365" y="1846263"/>
+            <a:ext cx="7436223" cy="4339384"/>
           </a:xfrm>
         </p:spPr>
       </p:pic>
     </p:spTree>
     <p:extLst>
       <p:ext uri="{BB962C8B-B14F-4D97-AF65-F5344CB8AC3E}">
-        <p14:creationId xmlns:p14="http://schemas.microsoft.com/office/powerpoint/2010/main" val="3205667000"/>
+        <p14:creationId xmlns:p14="http://schemas.microsoft.com/office/powerpoint/2010/main" val="4002466120"/>
       </p:ext>
     </p:extLst>
   </p:cSld>
@@ -6878,12 +7100,7 @@
             <p:ph type="title"/>
           </p:nvPr>
         </p:nvSpPr>
-        <p:spPr>
-          <a:xfrm>
-            <a:off x="739588" y="286603"/>
-            <a:ext cx="10416092" cy="1450757"/>
-          </a:xfrm>
-        </p:spPr>
+        <p:spPr/>
         <p:txBody>
           <a:bodyPr>
             <a:normAutofit/>
@@ -6891,18 +7108,11 @@
           <a:lstStyle/>
           <a:p>
             <a:r>
-              <a:rPr lang="en-US" sz="4000" dirty="0">
-                <a:latin typeface="Arial" panose="020B0604020202020204" pitchFamily="34" charset="0"/>
-                <a:cs typeface="Arial" panose="020B0604020202020204" pitchFamily="34" charset="0"/>
-              </a:rPr>
-              <a:t>Distribution of Average </a:t>
-            </a:r>
-            <a:r>
               <a:rPr lang="en-US" sz="4000" dirty="0" smtClean="0">
                 <a:latin typeface="Arial" panose="020B0604020202020204" pitchFamily="34" charset="0"/>
                 <a:cs typeface="Arial" panose="020B0604020202020204" pitchFamily="34" charset="0"/>
               </a:rPr>
-              <a:t>Annual Compensation</a:t>
+              <a:t>Distribution of Average Work Experience prior to MBA</a:t>
             </a:r>
             <a:endParaRPr lang="en-US" sz="4000" dirty="0">
               <a:latin typeface="Arial" panose="020B0604020202020204" pitchFamily="34" charset="0"/>
@@ -6935,15 +7145,15 @@
         </p:blipFill>
         <p:spPr>
           <a:xfrm>
-            <a:off x="2447365" y="1846263"/>
-            <a:ext cx="7436223" cy="4339384"/>
+            <a:off x="2339788" y="1846263"/>
+            <a:ext cx="7234517" cy="4022725"/>
           </a:xfrm>
         </p:spPr>
       </p:pic>
     </p:spTree>
     <p:extLst>
       <p:ext uri="{BB962C8B-B14F-4D97-AF65-F5344CB8AC3E}">
-        <p14:creationId xmlns:p14="http://schemas.microsoft.com/office/powerpoint/2010/main" val="4002466120"/>
+        <p14:creationId xmlns:p14="http://schemas.microsoft.com/office/powerpoint/2010/main" val="3205667000"/>
       </p:ext>
     </p:extLst>
   </p:cSld>

</xml_diff>